<commit_message>
update cycle de vie
</commit_message>
<xml_diff>
--- a/docs/assets/docs/schema-cycle-de-vie.pptx
+++ b/docs/assets/docs/schema-cycle-de-vie.pptx
@@ -10523,7 +10523,7 @@
         </p:nvSpPr>
         <p:spPr>
           <a:xfrm>
-            <a:off x="8296197" y="6104462"/>
+            <a:off x="8080744" y="6127268"/>
             <a:ext cx="2075321" cy="381108"/>
           </a:xfrm>
           <a:prstGeom prst="rect">
@@ -10601,7 +10601,7 @@
         </p:nvSpPr>
         <p:spPr>
           <a:xfrm>
-            <a:off x="6447269" y="6083207"/>
+            <a:off x="6231816" y="6126603"/>
             <a:ext cx="1702905" cy="381108"/>
           </a:xfrm>
           <a:prstGeom prst="rect">
@@ -10809,7 +10809,7 @@
         </p:nvSpPr>
         <p:spPr>
           <a:xfrm>
-            <a:off x="7668909" y="2791611"/>
+            <a:off x="7057831" y="3347845"/>
             <a:ext cx="2170038" cy="381108"/>
           </a:xfrm>
           <a:prstGeom prst="rect">
@@ -10887,7 +10887,7 @@
         </p:nvSpPr>
         <p:spPr>
           <a:xfrm>
-            <a:off x="6340873" y="4198870"/>
+            <a:off x="6231816" y="4290681"/>
             <a:ext cx="4214813" cy="1717000"/>
           </a:xfrm>
           <a:prstGeom prst="rect">
@@ -11452,7 +11452,7 @@
         </p:nvSpPr>
         <p:spPr>
           <a:xfrm>
-            <a:off x="7668909" y="1892279"/>
+            <a:off x="7057831" y="2448513"/>
             <a:ext cx="2920511" cy="849288"/>
           </a:xfrm>
           <a:prstGeom prst="rect">
@@ -11567,7 +11567,7 @@
         </p:blipFill>
         <p:spPr>
           <a:xfrm>
-            <a:off x="5954295" y="2376384"/>
+            <a:off x="5600673" y="2813102"/>
             <a:ext cx="1702899" cy="1702899"/>
           </a:xfrm>
           <a:prstGeom prst="rect">

</xml_diff>